<commit_message>
Update Community Talks 2023.7 slides & README.md
</commit_message>
<xml_diff>
--- a/ABP/Community-Talks-2023.7/Community-Talks-2023.7.pptx
+++ b/ABP/Community-Talks-2023.7/Community-Talks-2023.7.pptx
@@ -15,21 +15,22 @@
     <p:sldId id="259" r:id="rId9"/>
     <p:sldId id="260" r:id="rId10"/>
     <p:sldId id="261" r:id="rId11"/>
+    <p:sldId id="262" r:id="rId12"/>
   </p:sldIdLst>
   <p:sldSz cy="6858000" cx="12192000"/>
   <p:notesSz cx="6858000" cy="9144000"/>
   <p:embeddedFontLst>
     <p:embeddedFont>
       <p:font typeface="Poppins"/>
-      <p:regular r:id="rId12"/>
-      <p:bold r:id="rId13"/>
-      <p:italic r:id="rId14"/>
-      <p:boldItalic r:id="rId15"/>
+      <p:regular r:id="rId13"/>
+      <p:bold r:id="rId14"/>
+      <p:italic r:id="rId15"/>
+      <p:boldItalic r:id="rId16"/>
     </p:embeddedFont>
     <p:embeddedFont>
       <p:font typeface="Lexend"/>
-      <p:regular r:id="rId16"/>
-      <p:bold r:id="rId17"/>
+      <p:regular r:id="rId17"/>
+      <p:bold r:id="rId18"/>
     </p:embeddedFont>
   </p:embeddedFontLst>
   <p:defaultTextStyle>
@@ -263,7 +264,7 @@
   </p:defaultTextStyle>
   <p:extLst>
     <p:ext uri="GoogleSlidesCustomDataVersion2">
-      <go:slidesCustomData xmlns:go="http://customooxmlschemas.google.com/" r:id="rId18" roundtripDataSignature="AMtx7mi4bs2cT3R5TzGGxUZ9NJpiG+/L2w=="/>
+      <go:slidesCustomData xmlns:go="http://customooxmlschemas.google.com/" r:id="rId19" roundtripDataSignature="AMtx7mjFygp6T6miHI5vi0NTnp/cRuWDjw=="/>
     </p:ext>
   </p:extLst>
 </p:presentation>
@@ -844,59 +845,7 @@
               <a:buNone/>
             </a:pPr>
             <a:r>
-              <a:rPr lang="en-GB"/>
-              <a:t>We as the core ABP development team created a sample application to show what ABP’s CMS Kit Module is capable of. You can check the source code of the application from cms-kit-demo repository and also you can visit the cms-kit.abp.io website to see the demo application on live. </a:t>
-            </a:r>
-            <a:endParaRPr/>
-          </a:p>
-          <a:p>
-            <a:pPr indent="0" lvl="0" marL="0" rtl="0" algn="l">
-              <a:spcBef>
-                <a:spcPts val="0"/>
-              </a:spcBef>
-              <a:spcAft>
-                <a:spcPts val="0"/>
-              </a:spcAft>
-              <a:buNone/>
-            </a:pPr>
-            <a:r>
               <a:t/>
-            </a:r>
-            <a:endParaRPr/>
-          </a:p>
-          <a:p>
-            <a:pPr indent="0" lvl="0" marL="0" rtl="0" algn="l">
-              <a:spcBef>
-                <a:spcPts val="0"/>
-              </a:spcBef>
-              <a:spcAft>
-                <a:spcPts val="0"/>
-              </a:spcAft>
-              <a:buNone/>
-            </a:pPr>
-            <a:r>
-              <a:rPr lang="en-GB"/>
-              <a:t>Today, I will show </a:t>
-            </a:r>
-            <a:r>
-              <a:rPr lang="en-GB"/>
-              <a:t>you</a:t>
-            </a:r>
-            <a:r>
-              <a:rPr lang="en-GB"/>
-              <a:t> this application and we will see some CMS Kit features </a:t>
-            </a:r>
-            <a:r>
-              <a:rPr lang="en-GB">
-                <a:solidFill>
-                  <a:schemeClr val="dk1"/>
-                </a:solidFill>
-              </a:rPr>
-              <a:t>such as Pages, Blogging, Menu System and other features </a:t>
-            </a:r>
-            <a:r>
-              <a:rPr lang="en-GB"/>
-              <a:t>in action.</a:t>
             </a:r>
             <a:endParaRPr/>
           </a:p>
@@ -964,7 +913,7 @@
       </p:grpSpPr>
       <p:sp>
         <p:nvSpPr>
-          <p:cNvPr id="175" name="Google Shape;175;p2:notes"/>
+          <p:cNvPr id="175" name="Google Shape;175;g285d14a28f3_0_0:notes"/>
           <p:cNvSpPr txBox="1"/>
           <p:nvPr>
             <p:ph idx="1" type="body"/>
@@ -995,8 +944,7 @@
               <a:buNone/>
             </a:pPr>
             <a:r>
-              <a:rPr lang="en-GB"/>
-              <a:t>Before showing you the application, let’s just first take a glance at the main structure.</a:t>
+              <a:t/>
             </a:r>
             <a:endParaRPr/>
           </a:p>
@@ -1004,7 +952,106 @@
       </p:sp>
       <p:sp>
         <p:nvSpPr>
-          <p:cNvPr id="176" name="Google Shape;176;p2:notes"/>
+          <p:cNvPr id="176" name="Google Shape;176;g285d14a28f3_0_0:notes"/>
+          <p:cNvSpPr/>
+          <p:nvPr>
+            <p:ph idx="2" type="sldImg"/>
+          </p:nvPr>
+        </p:nvSpPr>
+        <p:spPr>
+          <a:xfrm>
+            <a:off x="1143225" y="685800"/>
+            <a:ext cx="4572300" cy="3429000"/>
+          </a:xfrm>
+          <a:custGeom>
+            <a:rect b="b" l="l" r="r" t="t"/>
+            <a:pathLst>
+              <a:path extrusionOk="0" h="120000" w="120000">
+                <a:moveTo>
+                  <a:pt x="0" y="0"/>
+                </a:moveTo>
+                <a:lnTo>
+                  <a:pt x="120000" y="0"/>
+                </a:lnTo>
+                <a:lnTo>
+                  <a:pt x="120000" y="120000"/>
+                </a:lnTo>
+                <a:lnTo>
+                  <a:pt x="0" y="120000"/>
+                </a:lnTo>
+                <a:close/>
+              </a:path>
+            </a:pathLst>
+          </a:custGeom>
+        </p:spPr>
+      </p:sp>
+    </p:spTree>
+  </p:cSld>
+  <p:clrMapOvr>
+    <a:masterClrMapping/>
+  </p:clrMapOvr>
+</p:notes>
+</file>
+
+<file path=ppt/notesSlides/notesSlide4.xml><?xml version="1.0" encoding="utf-8"?>
+<p:notes xmlns:a="http://schemas.openxmlformats.org/drawingml/2006/main" xmlns:r="http://schemas.openxmlformats.org/officeDocument/2006/relationships" xmlns:mc="http://schemas.openxmlformats.org/markup-compatibility/2006" xmlns:mv="urn:schemas-microsoft-com:mac:vml" xmlns:p="http://schemas.openxmlformats.org/presentationml/2006/main" xmlns:c="http://schemas.openxmlformats.org/drawingml/2006/chart" xmlns:dgm="http://schemas.openxmlformats.org/drawingml/2006/diagram" xmlns:o="urn:schemas-microsoft-com:office:office" xmlns:v="urn:schemas-microsoft-com:vml" xmlns:pvml="urn:schemas-microsoft-com:office:powerpoint" xmlns:com="http://schemas.openxmlformats.org/drawingml/2006/compatibility" xmlns:p14="http://schemas.microsoft.com/office/powerpoint/2010/main" xmlns:p15="http://schemas.microsoft.com/office/powerpoint/2012/main" xmlns:ahyp="http://schemas.microsoft.com/office/drawing/2018/hyperlinkcolor" showMasterPhAnim="0" showMasterSp="0">
+  <p:cSld>
+    <p:spTree>
+      <p:nvGrpSpPr>
+        <p:cNvPr id="182" name="Shape 182"/>
+        <p:cNvGrpSpPr/>
+        <p:nvPr/>
+      </p:nvGrpSpPr>
+      <p:grpSpPr>
+        <a:xfrm>
+          <a:off x="0" y="0"/>
+          <a:ext cx="0" cy="0"/>
+          <a:chOff x="0" y="0"/>
+          <a:chExt cx="0" cy="0"/>
+        </a:xfrm>
+      </p:grpSpPr>
+      <p:sp>
+        <p:nvSpPr>
+          <p:cNvPr id="183" name="Google Shape;183;p2:notes"/>
+          <p:cNvSpPr txBox="1"/>
+          <p:nvPr>
+            <p:ph idx="1" type="body"/>
+          </p:nvPr>
+        </p:nvSpPr>
+        <p:spPr>
+          <a:xfrm>
+            <a:off x="685800" y="4343400"/>
+            <a:ext cx="5486400" cy="4114800"/>
+          </a:xfrm>
+          <a:prstGeom prst="rect">
+            <a:avLst/>
+          </a:prstGeom>
+        </p:spPr>
+        <p:txBody>
+          <a:bodyPr anchorCtr="0" anchor="t" bIns="91425" lIns="91425" spcFirstLastPara="1" rIns="91425" wrap="square" tIns="91425">
+            <a:noAutofit/>
+          </a:bodyPr>
+          <a:lstStyle/>
+          <a:p>
+            <a:pPr indent="0" lvl="0" marL="0" rtl="0" algn="l">
+              <a:spcBef>
+                <a:spcPts val="0"/>
+              </a:spcBef>
+              <a:spcAft>
+                <a:spcPts val="0"/>
+              </a:spcAft>
+              <a:buNone/>
+            </a:pPr>
+            <a:r>
+              <a:t/>
+            </a:r>
+            <a:endParaRPr/>
+          </a:p>
+        </p:txBody>
+      </p:sp>
+      <p:sp>
+        <p:nvSpPr>
+          <p:cNvPr id="184" name="Google Shape;184;p2:notes"/>
           <p:cNvSpPr/>
           <p:nvPr>
             <p:ph idx="2" type="sldImg"/>
@@ -1045,12 +1092,12 @@
 </p:notes>
 </file>
 
-<file path=ppt/notesSlides/notesSlide4.xml><?xml version="1.0" encoding="utf-8"?>
+<file path=ppt/notesSlides/notesSlide5.xml><?xml version="1.0" encoding="utf-8"?>
 <p:notes xmlns:a="http://schemas.openxmlformats.org/drawingml/2006/main" xmlns:r="http://schemas.openxmlformats.org/officeDocument/2006/relationships" xmlns:mc="http://schemas.openxmlformats.org/markup-compatibility/2006" xmlns:mv="urn:schemas-microsoft-com:mac:vml" xmlns:p="http://schemas.openxmlformats.org/presentationml/2006/main" xmlns:c="http://schemas.openxmlformats.org/drawingml/2006/chart" xmlns:dgm="http://schemas.openxmlformats.org/drawingml/2006/diagram" xmlns:o="urn:schemas-microsoft-com:office:office" xmlns:v="urn:schemas-microsoft-com:vml" xmlns:pvml="urn:schemas-microsoft-com:office:powerpoint" xmlns:com="http://schemas.openxmlformats.org/drawingml/2006/compatibility" xmlns:p14="http://schemas.microsoft.com/office/powerpoint/2010/main" xmlns:p15="http://schemas.microsoft.com/office/powerpoint/2012/main" xmlns:ahyp="http://schemas.microsoft.com/office/drawing/2018/hyperlinkcolor" showMasterPhAnim="0" showMasterSp="0">
   <p:cSld>
     <p:spTree>
       <p:nvGrpSpPr>
-        <p:cNvPr id="181" name="Shape 181"/>
+        <p:cNvPr id="189" name="Shape 189"/>
         <p:cNvGrpSpPr/>
         <p:nvPr/>
       </p:nvGrpSpPr>
@@ -1064,7 +1111,7 @@
       </p:grpSpPr>
       <p:sp>
         <p:nvSpPr>
-          <p:cNvPr id="182" name="Google Shape;182;g281b0758ec4_0_80:notes"/>
+          <p:cNvPr id="190" name="Google Shape;190;g281b0758ec4_0_80:notes"/>
           <p:cNvSpPr txBox="1"/>
           <p:nvPr>
             <p:ph idx="1" type="body"/>
@@ -1103,132 +1150,7 @@
       </p:sp>
       <p:sp>
         <p:nvSpPr>
-          <p:cNvPr id="183" name="Google Shape;183;g281b0758ec4_0_80:notes"/>
-          <p:cNvSpPr/>
-          <p:nvPr>
-            <p:ph idx="2" type="sldImg"/>
-          </p:nvPr>
-        </p:nvSpPr>
-        <p:spPr>
-          <a:xfrm>
-            <a:off x="1143225" y="685800"/>
-            <a:ext cx="4572300" cy="3429000"/>
-          </a:xfrm>
-          <a:custGeom>
-            <a:rect b="b" l="l" r="r" t="t"/>
-            <a:pathLst>
-              <a:path extrusionOk="0" h="120000" w="120000">
-                <a:moveTo>
-                  <a:pt x="0" y="0"/>
-                </a:moveTo>
-                <a:lnTo>
-                  <a:pt x="120000" y="0"/>
-                </a:lnTo>
-                <a:lnTo>
-                  <a:pt x="120000" y="120000"/>
-                </a:lnTo>
-                <a:lnTo>
-                  <a:pt x="0" y="120000"/>
-                </a:lnTo>
-                <a:close/>
-              </a:path>
-            </a:pathLst>
-          </a:custGeom>
-        </p:spPr>
-      </p:sp>
-    </p:spTree>
-  </p:cSld>
-  <p:clrMapOvr>
-    <a:masterClrMapping/>
-  </p:clrMapOvr>
-</p:notes>
-</file>
-
-<file path=ppt/notesSlides/notesSlide5.xml><?xml version="1.0" encoding="utf-8"?>
-<p:notes xmlns:a="http://schemas.openxmlformats.org/drawingml/2006/main" xmlns:r="http://schemas.openxmlformats.org/officeDocument/2006/relationships" xmlns:mc="http://schemas.openxmlformats.org/markup-compatibility/2006" xmlns:mv="urn:schemas-microsoft-com:mac:vml" xmlns:p="http://schemas.openxmlformats.org/presentationml/2006/main" xmlns:c="http://schemas.openxmlformats.org/drawingml/2006/chart" xmlns:dgm="http://schemas.openxmlformats.org/drawingml/2006/diagram" xmlns:o="urn:schemas-microsoft-com:office:office" xmlns:v="urn:schemas-microsoft-com:vml" xmlns:pvml="urn:schemas-microsoft-com:office:powerpoint" xmlns:com="http://schemas.openxmlformats.org/drawingml/2006/compatibility" xmlns:p14="http://schemas.microsoft.com/office/powerpoint/2010/main" xmlns:p15="http://schemas.microsoft.com/office/powerpoint/2012/main" xmlns:ahyp="http://schemas.microsoft.com/office/drawing/2018/hyperlinkcolor" showMasterPhAnim="0" showMasterSp="0">
-  <p:cSld>
-    <p:spTree>
-      <p:nvGrpSpPr>
-        <p:cNvPr id="186" name="Shape 186"/>
-        <p:cNvGrpSpPr/>
-        <p:nvPr/>
-      </p:nvGrpSpPr>
-      <p:grpSpPr>
-        <a:xfrm>
-          <a:off x="0" y="0"/>
-          <a:ext cx="0" cy="0"/>
-          <a:chOff x="0" y="0"/>
-          <a:chExt cx="0" cy="0"/>
-        </a:xfrm>
-      </p:grpSpPr>
-      <p:sp>
-        <p:nvSpPr>
-          <p:cNvPr id="187" name="Google Shape;187;g2473751dd80_0_0:notes"/>
-          <p:cNvSpPr txBox="1"/>
-          <p:nvPr>
-            <p:ph idx="1" type="body"/>
-          </p:nvPr>
-        </p:nvSpPr>
-        <p:spPr>
-          <a:xfrm>
-            <a:off x="685800" y="4343400"/>
-            <a:ext cx="5486400" cy="4114800"/>
-          </a:xfrm>
-          <a:prstGeom prst="rect">
-            <a:avLst/>
-          </a:prstGeom>
-        </p:spPr>
-        <p:txBody>
-          <a:bodyPr anchorCtr="0" anchor="t" bIns="91425" lIns="91425" spcFirstLastPara="1" rIns="91425" wrap="square" tIns="91425">
-            <a:noAutofit/>
-          </a:bodyPr>
-          <a:lstStyle/>
-          <a:p>
-            <a:pPr indent="0" lvl="0" marL="457200" rtl="0" algn="l">
-              <a:lnSpc>
-                <a:spcPct val="150000"/>
-              </a:lnSpc>
-              <a:spcBef>
-                <a:spcPts val="0"/>
-              </a:spcBef>
-              <a:spcAft>
-                <a:spcPts val="0"/>
-              </a:spcAft>
-              <a:buNone/>
-            </a:pPr>
-            <a:r>
-              <a:t/>
-            </a:r>
-            <a:endParaRPr sz="1800">
-              <a:solidFill>
-                <a:srgbClr val="5B636F"/>
-              </a:solidFill>
-              <a:latin typeface="Poppins"/>
-              <a:ea typeface="Poppins"/>
-              <a:cs typeface="Poppins"/>
-              <a:sym typeface="Poppins"/>
-            </a:endParaRPr>
-          </a:p>
-          <a:p>
-            <a:pPr indent="0" lvl="0" marL="0" rtl="0" algn="l">
-              <a:spcBef>
-                <a:spcPts val="0"/>
-              </a:spcBef>
-              <a:spcAft>
-                <a:spcPts val="0"/>
-              </a:spcAft>
-              <a:buNone/>
-            </a:pPr>
-            <a:r>
-              <a:t/>
-            </a:r>
-            <a:endParaRPr/>
-          </a:p>
-        </p:txBody>
-      </p:sp>
-      <p:sp>
-        <p:nvSpPr>
-          <p:cNvPr id="188" name="Google Shape;188;g2473751dd80_0_0:notes"/>
+          <p:cNvPr id="191" name="Google Shape;191;g281b0758ec4_0_80:notes"/>
           <p:cNvSpPr/>
           <p:nvPr>
             <p:ph idx="2" type="sldImg"/>
@@ -1288,7 +1210,132 @@
       </p:grpSpPr>
       <p:sp>
         <p:nvSpPr>
-          <p:cNvPr id="195" name="Google Shape;195;p3:notes"/>
+          <p:cNvPr id="195" name="Google Shape;195;g2473751dd80_0_0:notes"/>
+          <p:cNvSpPr txBox="1"/>
+          <p:nvPr>
+            <p:ph idx="1" type="body"/>
+          </p:nvPr>
+        </p:nvSpPr>
+        <p:spPr>
+          <a:xfrm>
+            <a:off x="685800" y="4343400"/>
+            <a:ext cx="5486400" cy="4114800"/>
+          </a:xfrm>
+          <a:prstGeom prst="rect">
+            <a:avLst/>
+          </a:prstGeom>
+        </p:spPr>
+        <p:txBody>
+          <a:bodyPr anchorCtr="0" anchor="t" bIns="91425" lIns="91425" spcFirstLastPara="1" rIns="91425" wrap="square" tIns="91425">
+            <a:noAutofit/>
+          </a:bodyPr>
+          <a:lstStyle/>
+          <a:p>
+            <a:pPr indent="0" lvl="0" marL="457200" rtl="0" algn="l">
+              <a:lnSpc>
+                <a:spcPct val="150000"/>
+              </a:lnSpc>
+              <a:spcBef>
+                <a:spcPts val="0"/>
+              </a:spcBef>
+              <a:spcAft>
+                <a:spcPts val="0"/>
+              </a:spcAft>
+              <a:buNone/>
+            </a:pPr>
+            <a:r>
+              <a:t/>
+            </a:r>
+            <a:endParaRPr sz="1800">
+              <a:solidFill>
+                <a:srgbClr val="5B636F"/>
+              </a:solidFill>
+              <a:latin typeface="Poppins"/>
+              <a:ea typeface="Poppins"/>
+              <a:cs typeface="Poppins"/>
+              <a:sym typeface="Poppins"/>
+            </a:endParaRPr>
+          </a:p>
+          <a:p>
+            <a:pPr indent="0" lvl="0" marL="0" rtl="0" algn="l">
+              <a:spcBef>
+                <a:spcPts val="0"/>
+              </a:spcBef>
+              <a:spcAft>
+                <a:spcPts val="0"/>
+              </a:spcAft>
+              <a:buNone/>
+            </a:pPr>
+            <a:r>
+              <a:t/>
+            </a:r>
+            <a:endParaRPr/>
+          </a:p>
+        </p:txBody>
+      </p:sp>
+      <p:sp>
+        <p:nvSpPr>
+          <p:cNvPr id="196" name="Google Shape;196;g2473751dd80_0_0:notes"/>
+          <p:cNvSpPr/>
+          <p:nvPr>
+            <p:ph idx="2" type="sldImg"/>
+          </p:nvPr>
+        </p:nvSpPr>
+        <p:spPr>
+          <a:xfrm>
+            <a:off x="1143225" y="685800"/>
+            <a:ext cx="4572300" cy="3429000"/>
+          </a:xfrm>
+          <a:custGeom>
+            <a:rect b="b" l="l" r="r" t="t"/>
+            <a:pathLst>
+              <a:path extrusionOk="0" h="120000" w="120000">
+                <a:moveTo>
+                  <a:pt x="0" y="0"/>
+                </a:moveTo>
+                <a:lnTo>
+                  <a:pt x="120000" y="0"/>
+                </a:lnTo>
+                <a:lnTo>
+                  <a:pt x="120000" y="120000"/>
+                </a:lnTo>
+                <a:lnTo>
+                  <a:pt x="0" y="120000"/>
+                </a:lnTo>
+                <a:close/>
+              </a:path>
+            </a:pathLst>
+          </a:custGeom>
+        </p:spPr>
+      </p:sp>
+    </p:spTree>
+  </p:cSld>
+  <p:clrMapOvr>
+    <a:masterClrMapping/>
+  </p:clrMapOvr>
+</p:notes>
+</file>
+
+<file path=ppt/notesSlides/notesSlide7.xml><?xml version="1.0" encoding="utf-8"?>
+<p:notes xmlns:a="http://schemas.openxmlformats.org/drawingml/2006/main" xmlns:r="http://schemas.openxmlformats.org/officeDocument/2006/relationships" xmlns:mc="http://schemas.openxmlformats.org/markup-compatibility/2006" xmlns:mv="urn:schemas-microsoft-com:mac:vml" xmlns:p="http://schemas.openxmlformats.org/presentationml/2006/main" xmlns:c="http://schemas.openxmlformats.org/drawingml/2006/chart" xmlns:dgm="http://schemas.openxmlformats.org/drawingml/2006/diagram" xmlns:o="urn:schemas-microsoft-com:office:office" xmlns:v="urn:schemas-microsoft-com:vml" xmlns:pvml="urn:schemas-microsoft-com:office:powerpoint" xmlns:com="http://schemas.openxmlformats.org/drawingml/2006/compatibility" xmlns:p14="http://schemas.microsoft.com/office/powerpoint/2010/main" xmlns:p15="http://schemas.microsoft.com/office/powerpoint/2012/main" xmlns:ahyp="http://schemas.microsoft.com/office/drawing/2018/hyperlinkcolor" showMasterPhAnim="0" showMasterSp="0">
+  <p:cSld>
+    <p:spTree>
+      <p:nvGrpSpPr>
+        <p:cNvPr id="202" name="Shape 202"/>
+        <p:cNvGrpSpPr/>
+        <p:nvPr/>
+      </p:nvGrpSpPr>
+      <p:grpSpPr>
+        <a:xfrm>
+          <a:off x="0" y="0"/>
+          <a:ext cx="0" cy="0"/>
+          <a:chOff x="0" y="0"/>
+          <a:chExt cx="0" cy="0"/>
+        </a:xfrm>
+      </p:grpSpPr>
+      <p:sp>
+        <p:nvSpPr>
+          <p:cNvPr id="203" name="Google Shape;203;p3:notes"/>
           <p:cNvSpPr txBox="1"/>
           <p:nvPr>
             <p:ph idx="1" type="body"/>
@@ -1327,7 +1374,7 @@
       </p:sp>
       <p:sp>
         <p:nvSpPr>
-          <p:cNvPr id="196" name="Google Shape;196;p3:notes"/>
+          <p:cNvPr id="204" name="Google Shape;204;p3:notes"/>
           <p:cNvSpPr/>
           <p:nvPr>
             <p:ph idx="2" type="sldImg"/>
@@ -21854,6 +21901,18 @@
               </a:rPr>
               <a:t>cms-kit-demo.abp.io</a:t>
             </a:r>
+            <a:r>
+              <a:rPr lang="en-GB" sz="1800">
+                <a:solidFill>
+                  <a:srgbClr val="5B636F"/>
+                </a:solidFill>
+                <a:latin typeface="Poppins"/>
+                <a:ea typeface="Poppins"/>
+                <a:cs typeface="Poppins"/>
+                <a:sym typeface="Poppins"/>
+              </a:rPr>
+              <a:t> (will be live soon)</a:t>
+            </a:r>
             <a:endParaRPr sz="1800">
               <a:solidFill>
                 <a:srgbClr val="5B636F"/>
@@ -21987,7 +22046,244 @@
       </p:grpSpPr>
       <p:sp>
         <p:nvSpPr>
-          <p:cNvPr id="178" name="Google Shape;178;p2"/>
+          <p:cNvPr id="178" name="Google Shape;178;g285d14a28f3_0_0"/>
+          <p:cNvSpPr txBox="1"/>
+          <p:nvPr/>
+        </p:nvSpPr>
+        <p:spPr>
+          <a:xfrm>
+            <a:off x="714375" y="695325"/>
+            <a:ext cx="9548700" cy="1077300"/>
+          </a:xfrm>
+          <a:prstGeom prst="rect">
+            <a:avLst/>
+          </a:prstGeom>
+          <a:noFill/>
+          <a:ln>
+            <a:noFill/>
+          </a:ln>
+        </p:spPr>
+        <p:txBody>
+          <a:bodyPr anchorCtr="0" anchor="t" bIns="45700" lIns="91425" spcFirstLastPara="1" rIns="91425" wrap="square" tIns="45700">
+            <a:spAutoFit/>
+          </a:bodyPr>
+          <a:lstStyle/>
+          <a:p>
+            <a:pPr indent="0" lvl="0" marL="0" marR="0" rtl="0" algn="l">
+              <a:spcBef>
+                <a:spcPts val="0"/>
+              </a:spcBef>
+              <a:spcAft>
+                <a:spcPts val="0"/>
+              </a:spcAft>
+              <a:buNone/>
+            </a:pPr>
+            <a:r>
+              <a:rPr b="1" lang="en-GB" sz="3200">
+                <a:solidFill>
+                  <a:srgbClr val="292D33"/>
+                </a:solidFill>
+                <a:latin typeface="Lexend"/>
+                <a:ea typeface="Lexend"/>
+                <a:cs typeface="Lexend"/>
+                <a:sym typeface="Lexend"/>
+              </a:rPr>
+              <a:t>Unleash the Power of ABP CMS Kit: A Dynamic Content Showcase</a:t>
+            </a:r>
+            <a:endParaRPr b="1" sz="3200">
+              <a:solidFill>
+                <a:srgbClr val="292D33"/>
+              </a:solidFill>
+              <a:latin typeface="Lexend"/>
+              <a:ea typeface="Lexend"/>
+              <a:cs typeface="Lexend"/>
+              <a:sym typeface="Lexend"/>
+            </a:endParaRPr>
+          </a:p>
+        </p:txBody>
+      </p:sp>
+      <p:sp>
+        <p:nvSpPr>
+          <p:cNvPr id="179" name="Google Shape;179;g285d14a28f3_0_0"/>
+          <p:cNvSpPr txBox="1"/>
+          <p:nvPr/>
+        </p:nvSpPr>
+        <p:spPr>
+          <a:xfrm>
+            <a:off x="850050" y="5577675"/>
+            <a:ext cx="10491900" cy="369300"/>
+          </a:xfrm>
+          <a:prstGeom prst="rect">
+            <a:avLst/>
+          </a:prstGeom>
+          <a:noFill/>
+          <a:ln>
+            <a:noFill/>
+          </a:ln>
+        </p:spPr>
+        <p:txBody>
+          <a:bodyPr anchorCtr="0" anchor="t" bIns="45700" lIns="91425" spcFirstLastPara="1" rIns="91425" wrap="square" tIns="45700">
+            <a:spAutoFit/>
+          </a:bodyPr>
+          <a:lstStyle/>
+          <a:p>
+            <a:pPr indent="0" lvl="0" marL="0" marR="0" rtl="0" algn="l">
+              <a:lnSpc>
+                <a:spcPct val="150000"/>
+              </a:lnSpc>
+              <a:spcBef>
+                <a:spcPts val="0"/>
+              </a:spcBef>
+              <a:spcAft>
+                <a:spcPts val="0"/>
+              </a:spcAft>
+              <a:buNone/>
+            </a:pPr>
+            <a:r>
+              <a:t/>
+            </a:r>
+            <a:endParaRPr sz="1800">
+              <a:solidFill>
+                <a:srgbClr val="5B636F"/>
+              </a:solidFill>
+              <a:latin typeface="Poppins"/>
+              <a:ea typeface="Poppins"/>
+              <a:cs typeface="Poppins"/>
+              <a:sym typeface="Poppins"/>
+            </a:endParaRPr>
+          </a:p>
+        </p:txBody>
+      </p:sp>
+      <p:pic>
+        <p:nvPicPr>
+          <p:cNvPr id="180" name="Google Shape;180;g285d14a28f3_0_0"/>
+          <p:cNvPicPr preferRelativeResize="0"/>
+          <p:nvPr/>
+        </p:nvPicPr>
+        <p:blipFill>
+          <a:blip r:embed="rId4">
+            <a:alphaModFix/>
+          </a:blip>
+          <a:stretch>
+            <a:fillRect/>
+          </a:stretch>
+        </p:blipFill>
+        <p:spPr>
+          <a:xfrm>
+            <a:off x="850050" y="1925025"/>
+            <a:ext cx="5051551" cy="4576250"/>
+          </a:xfrm>
+          <a:prstGeom prst="rect">
+            <a:avLst/>
+          </a:prstGeom>
+          <a:noFill/>
+          <a:ln>
+            <a:noFill/>
+          </a:ln>
+        </p:spPr>
+      </p:pic>
+      <p:sp>
+        <p:nvSpPr>
+          <p:cNvPr id="181" name="Google Shape;181;g285d14a28f3_0_0"/>
+          <p:cNvSpPr txBox="1"/>
+          <p:nvPr/>
+        </p:nvSpPr>
+        <p:spPr>
+          <a:xfrm>
+            <a:off x="6233550" y="3612850"/>
+            <a:ext cx="5108400" cy="1200600"/>
+          </a:xfrm>
+          <a:prstGeom prst="rect">
+            <a:avLst/>
+          </a:prstGeom>
+          <a:noFill/>
+          <a:ln>
+            <a:noFill/>
+          </a:ln>
+        </p:spPr>
+        <p:txBody>
+          <a:bodyPr anchorCtr="0" anchor="t" bIns="45700" lIns="91425" spcFirstLastPara="1" rIns="91425" wrap="square" tIns="45700">
+            <a:spAutoFit/>
+          </a:bodyPr>
+          <a:lstStyle/>
+          <a:p>
+            <a:pPr indent="0" lvl="0" marL="0" marR="0" rtl="0" algn="l">
+              <a:lnSpc>
+                <a:spcPct val="150000"/>
+              </a:lnSpc>
+              <a:spcBef>
+                <a:spcPts val="0"/>
+              </a:spcBef>
+              <a:spcAft>
+                <a:spcPts val="0"/>
+              </a:spcAft>
+              <a:buNone/>
+            </a:pPr>
+            <a:r>
+              <a:rPr lang="en-GB" sz="1800" u="sng">
+                <a:solidFill>
+                  <a:schemeClr val="hlink"/>
+                </a:solidFill>
+                <a:latin typeface="Poppins"/>
+                <a:ea typeface="Poppins"/>
+                <a:cs typeface="Poppins"/>
+                <a:sym typeface="Poppins"/>
+                <a:hlinkClick r:id="rId5"/>
+              </a:rPr>
+              <a:t>https://blog.abp.io/abp/Unleash-the-Power-of-ABP-CMS-Kit-A-Dynamic-Content-Showcase</a:t>
+            </a:r>
+            <a:endParaRPr sz="1800">
+              <a:solidFill>
+                <a:srgbClr val="5B636F"/>
+              </a:solidFill>
+              <a:latin typeface="Poppins"/>
+              <a:ea typeface="Poppins"/>
+              <a:cs typeface="Poppins"/>
+              <a:sym typeface="Poppins"/>
+            </a:endParaRPr>
+          </a:p>
+        </p:txBody>
+      </p:sp>
+    </p:spTree>
+  </p:cSld>
+  <p:clrMapOvr>
+    <a:masterClrMapping/>
+  </p:clrMapOvr>
+</p:sld>
+</file>
+
+<file path=ppt/slides/slide4.xml><?xml version="1.0" encoding="utf-8"?>
+<p:sld xmlns:a="http://schemas.openxmlformats.org/drawingml/2006/main" xmlns:r="http://schemas.openxmlformats.org/officeDocument/2006/relationships" xmlns:mc="http://schemas.openxmlformats.org/markup-compatibility/2006" xmlns:mv="urn:schemas-microsoft-com:mac:vml" xmlns:p="http://schemas.openxmlformats.org/presentationml/2006/main" xmlns:c="http://schemas.openxmlformats.org/drawingml/2006/chart" xmlns:dgm="http://schemas.openxmlformats.org/drawingml/2006/diagram" xmlns:o="urn:schemas-microsoft-com:office:office" xmlns:v="urn:schemas-microsoft-com:vml" xmlns:pvml="urn:schemas-microsoft-com:office:powerpoint" xmlns:com="http://schemas.openxmlformats.org/drawingml/2006/compatibility" xmlns:p14="http://schemas.microsoft.com/office/powerpoint/2010/main" xmlns:p15="http://schemas.microsoft.com/office/powerpoint/2012/main" xmlns:ahyp="http://schemas.microsoft.com/office/drawing/2018/hyperlinkcolor">
+  <p:cSld>
+    <p:bg>
+      <p:bgPr>
+        <a:blipFill>
+          <a:blip r:embed="rId3">
+            <a:alphaModFix/>
+          </a:blip>
+          <a:stretch>
+            <a:fillRect/>
+          </a:stretch>
+        </a:blipFill>
+      </p:bgPr>
+    </p:bg>
+    <p:spTree>
+      <p:nvGrpSpPr>
+        <p:cNvPr id="185" name="Shape 185"/>
+        <p:cNvGrpSpPr/>
+        <p:nvPr/>
+      </p:nvGrpSpPr>
+      <p:grpSpPr>
+        <a:xfrm>
+          <a:off x="0" y="0"/>
+          <a:ext cx="0" cy="0"/>
+          <a:chOff x="0" y="0"/>
+          <a:chExt cx="0" cy="0"/>
+        </a:xfrm>
+      </p:grpSpPr>
+      <p:sp>
+        <p:nvSpPr>
+          <p:cNvPr id="186" name="Google Shape;186;p2"/>
           <p:cNvSpPr txBox="1"/>
           <p:nvPr/>
         </p:nvSpPr>
@@ -22049,7 +22345,7 @@
       </p:sp>
       <p:sp>
         <p:nvSpPr>
-          <p:cNvPr id="179" name="Google Shape;179;p2"/>
+          <p:cNvPr id="187" name="Google Shape;187;p2"/>
           <p:cNvSpPr txBox="1"/>
           <p:nvPr/>
         </p:nvSpPr>
@@ -22628,7 +22924,7 @@
       </p:sp>
       <p:pic>
         <p:nvPicPr>
-          <p:cNvPr id="180" name="Google Shape;180;p2"/>
+          <p:cNvPr id="188" name="Google Shape;188;p2"/>
           <p:cNvPicPr preferRelativeResize="0"/>
           <p:nvPr/>
         </p:nvPicPr>
@@ -22662,7 +22958,7 @@
 </p:sld>
 </file>
 
-<file path=ppt/slides/slide4.xml><?xml version="1.0" encoding="utf-8"?>
+<file path=ppt/slides/slide5.xml><?xml version="1.0" encoding="utf-8"?>
 <p:sld xmlns:a="http://schemas.openxmlformats.org/drawingml/2006/main" xmlns:r="http://schemas.openxmlformats.org/officeDocument/2006/relationships" xmlns:mc="http://schemas.openxmlformats.org/markup-compatibility/2006" xmlns:mv="urn:schemas-microsoft-com:mac:vml" xmlns:p="http://schemas.openxmlformats.org/presentationml/2006/main" xmlns:c="http://schemas.openxmlformats.org/drawingml/2006/chart" xmlns:dgm="http://schemas.openxmlformats.org/drawingml/2006/diagram" xmlns:o="urn:schemas-microsoft-com:office:office" xmlns:v="urn:schemas-microsoft-com:vml" xmlns:pvml="urn:schemas-microsoft-com:office:powerpoint" xmlns:com="http://schemas.openxmlformats.org/drawingml/2006/compatibility" xmlns:p14="http://schemas.microsoft.com/office/powerpoint/2010/main" xmlns:p15="http://schemas.microsoft.com/office/powerpoint/2012/main" xmlns:ahyp="http://schemas.microsoft.com/office/drawing/2018/hyperlinkcolor">
   <p:cSld>
     <p:bg>
@@ -22679,7 +22975,7 @@
     </p:bg>
     <p:spTree>
       <p:nvGrpSpPr>
-        <p:cNvPr id="184" name="Shape 184"/>
+        <p:cNvPr id="192" name="Shape 192"/>
         <p:cNvGrpSpPr/>
         <p:nvPr/>
       </p:nvGrpSpPr>
@@ -22693,7 +22989,7 @@
       </p:grpSpPr>
       <p:sp>
         <p:nvSpPr>
-          <p:cNvPr id="185" name="Google Shape;185;g281b0758ec4_0_80"/>
+          <p:cNvPr id="193" name="Google Shape;193;g281b0758ec4_0_80"/>
           <p:cNvSpPr txBox="1"/>
           <p:nvPr>
             <p:ph idx="1" type="body"/>
@@ -22758,7 +23054,7 @@
 </p:sld>
 </file>
 
-<file path=ppt/slides/slide5.xml><?xml version="1.0" encoding="utf-8"?>
+<file path=ppt/slides/slide6.xml><?xml version="1.0" encoding="utf-8"?>
 <p:sld xmlns:a="http://schemas.openxmlformats.org/drawingml/2006/main" xmlns:r="http://schemas.openxmlformats.org/officeDocument/2006/relationships" xmlns:mc="http://schemas.openxmlformats.org/markup-compatibility/2006" xmlns:mv="urn:schemas-microsoft-com:mac:vml" xmlns:p="http://schemas.openxmlformats.org/presentationml/2006/main" xmlns:c="http://schemas.openxmlformats.org/drawingml/2006/chart" xmlns:dgm="http://schemas.openxmlformats.org/drawingml/2006/diagram" xmlns:o="urn:schemas-microsoft-com:office:office" xmlns:v="urn:schemas-microsoft-com:vml" xmlns:pvml="urn:schemas-microsoft-com:office:powerpoint" xmlns:com="http://schemas.openxmlformats.org/drawingml/2006/compatibility" xmlns:p14="http://schemas.microsoft.com/office/powerpoint/2010/main" xmlns:p15="http://schemas.microsoft.com/office/powerpoint/2012/main" xmlns:ahyp="http://schemas.microsoft.com/office/drawing/2018/hyperlinkcolor">
   <p:cSld>
     <p:bg>
@@ -22775,7 +23071,7 @@
     </p:bg>
     <p:spTree>
       <p:nvGrpSpPr>
-        <p:cNvPr id="189" name="Shape 189"/>
+        <p:cNvPr id="197" name="Shape 197"/>
         <p:cNvGrpSpPr/>
         <p:nvPr/>
       </p:nvGrpSpPr>
@@ -22789,7 +23085,7 @@
       </p:grpSpPr>
       <p:sp>
         <p:nvSpPr>
-          <p:cNvPr id="190" name="Google Shape;190;g2473751dd80_0_0"/>
+          <p:cNvPr id="198" name="Google Shape;198;g2473751dd80_0_0"/>
           <p:cNvSpPr txBox="1"/>
           <p:nvPr/>
         </p:nvSpPr>
@@ -22851,7 +23147,7 @@
       </p:sp>
       <p:sp>
         <p:nvSpPr>
-          <p:cNvPr id="191" name="Google Shape;191;g2473751dd80_0_0"/>
+          <p:cNvPr id="199" name="Google Shape;199;g2473751dd80_0_0"/>
           <p:cNvSpPr txBox="1"/>
           <p:nvPr/>
         </p:nvSpPr>
@@ -23131,7 +23427,7 @@
       </p:sp>
       <p:sp>
         <p:nvSpPr>
-          <p:cNvPr id="192" name="Google Shape;192;g2473751dd80_0_0"/>
+          <p:cNvPr id="200" name="Google Shape;200;g2473751dd80_0_0"/>
           <p:cNvSpPr txBox="1"/>
           <p:nvPr/>
         </p:nvSpPr>
@@ -23308,7 +23604,7 @@
       </p:sp>
       <p:sp>
         <p:nvSpPr>
-          <p:cNvPr id="193" name="Google Shape;193;g2473751dd80_0_0"/>
+          <p:cNvPr id="201" name="Google Shape;201;g2473751dd80_0_0"/>
           <p:cNvSpPr txBox="1"/>
           <p:nvPr/>
         </p:nvSpPr>
@@ -23411,7 +23707,7 @@
 </p:sld>
 </file>
 
-<file path=ppt/slides/slide6.xml><?xml version="1.0" encoding="utf-8"?>
+<file path=ppt/slides/slide7.xml><?xml version="1.0" encoding="utf-8"?>
 <p:sld xmlns:a="http://schemas.openxmlformats.org/drawingml/2006/main" xmlns:r="http://schemas.openxmlformats.org/officeDocument/2006/relationships" xmlns:mc="http://schemas.openxmlformats.org/markup-compatibility/2006" xmlns:mv="urn:schemas-microsoft-com:mac:vml" xmlns:p="http://schemas.openxmlformats.org/presentationml/2006/main" xmlns:c="http://schemas.openxmlformats.org/drawingml/2006/chart" xmlns:dgm="http://schemas.openxmlformats.org/drawingml/2006/diagram" xmlns:o="urn:schemas-microsoft-com:office:office" xmlns:v="urn:schemas-microsoft-com:vml" xmlns:pvml="urn:schemas-microsoft-com:office:powerpoint" xmlns:com="http://schemas.openxmlformats.org/drawingml/2006/compatibility" xmlns:p14="http://schemas.microsoft.com/office/powerpoint/2010/main" xmlns:p15="http://schemas.microsoft.com/office/powerpoint/2012/main" xmlns:ahyp="http://schemas.microsoft.com/office/drawing/2018/hyperlinkcolor">
   <p:cSld>
     <p:bg>
@@ -23428,7 +23724,7 @@
     </p:bg>
     <p:spTree>
       <p:nvGrpSpPr>
-        <p:cNvPr id="197" name="Shape 197"/>
+        <p:cNvPr id="205" name="Shape 205"/>
         <p:cNvGrpSpPr/>
         <p:nvPr/>
       </p:nvGrpSpPr>
@@ -23442,7 +23738,7 @@
       </p:grpSpPr>
       <p:pic>
         <p:nvPicPr>
-          <p:cNvPr id="198" name="Google Shape;198;p3"/>
+          <p:cNvPr id="206" name="Google Shape;206;p3"/>
           <p:cNvPicPr preferRelativeResize="0"/>
           <p:nvPr/>
         </p:nvPicPr>
@@ -23469,7 +23765,7 @@
       </p:pic>
       <p:pic>
         <p:nvPicPr>
-          <p:cNvPr id="199" name="Google Shape;199;p3"/>
+          <p:cNvPr id="207" name="Google Shape;207;p3"/>
           <p:cNvPicPr preferRelativeResize="0"/>
           <p:nvPr/>
         </p:nvPicPr>
@@ -23496,14 +23792,14 @@
       </p:pic>
       <p:sp>
         <p:nvSpPr>
-          <p:cNvPr id="200" name="Google Shape;200;p3"/>
+          <p:cNvPr id="208" name="Google Shape;208;p3"/>
           <p:cNvSpPr txBox="1"/>
           <p:nvPr/>
         </p:nvSpPr>
         <p:spPr>
           <a:xfrm>
             <a:off x="4992441" y="2003724"/>
-            <a:ext cx="4993896" cy="1815882"/>
+            <a:ext cx="4993800" cy="1815900"/>
           </a:xfrm>
           <a:prstGeom prst="rect">
             <a:avLst/>
@@ -23585,9 +23881,9 @@
 </file>
 
 <file path=ppt/theme/theme1.xml><?xml version="1.0" encoding="utf-8"?>
-<a:theme xmlns:a="http://schemas.openxmlformats.org/drawingml/2006/main" xmlns:r="http://schemas.openxmlformats.org/officeDocument/2006/relationships">
+<a:theme xmlns:a="http://schemas.openxmlformats.org/drawingml/2006/main" xmlns:r="http://schemas.openxmlformats.org/officeDocument/2006/relationships" name="Office Teması">
   <a:themeElements>
-    <a:clrScheme name="Default">
+    <a:clrScheme name="Office">
       <a:dk1>
         <a:srgbClr val="000000"/>
       </a:dk1>
@@ -23595,34 +23891,34 @@
         <a:srgbClr val="FFFFFF"/>
       </a:lt1>
       <a:dk2>
-        <a:srgbClr val="158158"/>
+        <a:srgbClr val="44546A"/>
       </a:dk2>
       <a:lt2>
-        <a:srgbClr val="F3F3F3"/>
+        <a:srgbClr val="E7E6E6"/>
       </a:lt2>
       <a:accent1>
-        <a:srgbClr val="058DC7"/>
+        <a:srgbClr val="4472C4"/>
       </a:accent1>
       <a:accent2>
-        <a:srgbClr val="50B432"/>
+        <a:srgbClr val="ED7D31"/>
       </a:accent2>
       <a:accent3>
-        <a:srgbClr val="ED561B"/>
+        <a:srgbClr val="A5A5A5"/>
       </a:accent3>
       <a:accent4>
-        <a:srgbClr val="EDEF00"/>
+        <a:srgbClr val="FFC000"/>
       </a:accent4>
       <a:accent5>
-        <a:srgbClr val="24CBE5"/>
+        <a:srgbClr val="5B9BD5"/>
       </a:accent5>
       <a:accent6>
-        <a:srgbClr val="64E572"/>
+        <a:srgbClr val="70AD47"/>
       </a:accent6>
       <a:hlink>
-        <a:srgbClr val="2200CC"/>
+        <a:srgbClr val="0563C1"/>
       </a:hlink>
       <a:folHlink>
-        <a:srgbClr val="551A8B"/>
+        <a:srgbClr val="954F72"/>
       </a:folHlink>
     </a:clrScheme>
     <a:fontScheme name="Office">
@@ -23864,9 +24160,9 @@
 </file>
 
 <file path=ppt/theme/theme2.xml><?xml version="1.0" encoding="utf-8"?>
-<a:theme xmlns:a="http://schemas.openxmlformats.org/drawingml/2006/main" xmlns:r="http://schemas.openxmlformats.org/officeDocument/2006/relationships" name="Office Teması">
+<a:theme xmlns:a="http://schemas.openxmlformats.org/drawingml/2006/main" xmlns:r="http://schemas.openxmlformats.org/officeDocument/2006/relationships">
   <a:themeElements>
-    <a:clrScheme name="Office">
+    <a:clrScheme name="Default">
       <a:dk1>
         <a:srgbClr val="000000"/>
       </a:dk1>
@@ -23874,34 +24170,34 @@
         <a:srgbClr val="FFFFFF"/>
       </a:lt1>
       <a:dk2>
-        <a:srgbClr val="44546A"/>
+        <a:srgbClr val="158158"/>
       </a:dk2>
       <a:lt2>
-        <a:srgbClr val="E7E6E6"/>
+        <a:srgbClr val="F3F3F3"/>
       </a:lt2>
       <a:accent1>
-        <a:srgbClr val="4472C4"/>
+        <a:srgbClr val="058DC7"/>
       </a:accent1>
       <a:accent2>
-        <a:srgbClr val="ED7D31"/>
+        <a:srgbClr val="50B432"/>
       </a:accent2>
       <a:accent3>
-        <a:srgbClr val="A5A5A5"/>
+        <a:srgbClr val="ED561B"/>
       </a:accent3>
       <a:accent4>
-        <a:srgbClr val="FFC000"/>
+        <a:srgbClr val="EDEF00"/>
       </a:accent4>
       <a:accent5>
-        <a:srgbClr val="5B9BD5"/>
+        <a:srgbClr val="24CBE5"/>
       </a:accent5>
       <a:accent6>
-        <a:srgbClr val="70AD47"/>
+        <a:srgbClr val="64E572"/>
       </a:accent6>
       <a:hlink>
-        <a:srgbClr val="0563C1"/>
+        <a:srgbClr val="2200CC"/>
       </a:hlink>
       <a:folHlink>
-        <a:srgbClr val="954F72"/>
+        <a:srgbClr val="551A8B"/>
       </a:folHlink>
     </a:clrScheme>
     <a:fontScheme name="Office">

</xml_diff>